<commit_message>
Add number to diagram
</commit_message>
<xml_diff>
--- a/Documentation/Architecture Diagram.pptx
+++ b/Documentation/Architecture Diagram.pptx
@@ -104,6 +104,11 @@
       </a:defRPr>
     </a:lvl9pPr>
   </p:defaultTextStyle>
+  <p:extLst>
+    <p:ext uri="{EFAFB233-063F-42B5-8137-9DF3F51BA10A}">
+      <p15:sldGuideLst xmlns:p15="http://schemas.microsoft.com/office/powerpoint/2012/main"/>
+    </p:ext>
+  </p:extLst>
 </p:presentation>
 </file>
 
@@ -238,7 +243,7 @@
           <a:p>
             <a:fld id="{9C0B748F-EC5C-472B-8836-94BE95C08E9F}" type="datetimeFigureOut">
               <a:rPr lang="en-GB" smtClean="0"/>
-              <a:t>17/02/2014</a:t>
+              <a:t>19/02/2014</a:t>
             </a:fld>
             <a:endParaRPr lang="en-GB"/>
           </a:p>
@@ -408,7 +413,7 @@
           <a:p>
             <a:fld id="{9C0B748F-EC5C-472B-8836-94BE95C08E9F}" type="datetimeFigureOut">
               <a:rPr lang="en-GB" smtClean="0"/>
-              <a:t>17/02/2014</a:t>
+              <a:t>19/02/2014</a:t>
             </a:fld>
             <a:endParaRPr lang="en-GB"/>
           </a:p>
@@ -588,7 +593,7 @@
           <a:p>
             <a:fld id="{9C0B748F-EC5C-472B-8836-94BE95C08E9F}" type="datetimeFigureOut">
               <a:rPr lang="en-GB" smtClean="0"/>
-              <a:t>17/02/2014</a:t>
+              <a:t>19/02/2014</a:t>
             </a:fld>
             <a:endParaRPr lang="en-GB"/>
           </a:p>
@@ -758,7 +763,7 @@
           <a:p>
             <a:fld id="{9C0B748F-EC5C-472B-8836-94BE95C08E9F}" type="datetimeFigureOut">
               <a:rPr lang="en-GB" smtClean="0"/>
-              <a:t>17/02/2014</a:t>
+              <a:t>19/02/2014</a:t>
             </a:fld>
             <a:endParaRPr lang="en-GB"/>
           </a:p>
@@ -1004,7 +1009,7 @@
           <a:p>
             <a:fld id="{9C0B748F-EC5C-472B-8836-94BE95C08E9F}" type="datetimeFigureOut">
               <a:rPr lang="en-GB" smtClean="0"/>
-              <a:t>17/02/2014</a:t>
+              <a:t>19/02/2014</a:t>
             </a:fld>
             <a:endParaRPr lang="en-GB"/>
           </a:p>
@@ -1236,7 +1241,7 @@
           <a:p>
             <a:fld id="{9C0B748F-EC5C-472B-8836-94BE95C08E9F}" type="datetimeFigureOut">
               <a:rPr lang="en-GB" smtClean="0"/>
-              <a:t>17/02/2014</a:t>
+              <a:t>19/02/2014</a:t>
             </a:fld>
             <a:endParaRPr lang="en-GB"/>
           </a:p>
@@ -1603,7 +1608,7 @@
           <a:p>
             <a:fld id="{9C0B748F-EC5C-472B-8836-94BE95C08E9F}" type="datetimeFigureOut">
               <a:rPr lang="en-GB" smtClean="0"/>
-              <a:t>17/02/2014</a:t>
+              <a:t>19/02/2014</a:t>
             </a:fld>
             <a:endParaRPr lang="en-GB"/>
           </a:p>
@@ -1721,7 +1726,7 @@
           <a:p>
             <a:fld id="{9C0B748F-EC5C-472B-8836-94BE95C08E9F}" type="datetimeFigureOut">
               <a:rPr lang="en-GB" smtClean="0"/>
-              <a:t>17/02/2014</a:t>
+              <a:t>19/02/2014</a:t>
             </a:fld>
             <a:endParaRPr lang="en-GB"/>
           </a:p>
@@ -1816,7 +1821,7 @@
           <a:p>
             <a:fld id="{9C0B748F-EC5C-472B-8836-94BE95C08E9F}" type="datetimeFigureOut">
               <a:rPr lang="en-GB" smtClean="0"/>
-              <a:t>17/02/2014</a:t>
+              <a:t>19/02/2014</a:t>
             </a:fld>
             <a:endParaRPr lang="en-GB"/>
           </a:p>
@@ -2093,7 +2098,7 @@
           <a:p>
             <a:fld id="{9C0B748F-EC5C-472B-8836-94BE95C08E9F}" type="datetimeFigureOut">
               <a:rPr lang="en-GB" smtClean="0"/>
-              <a:t>17/02/2014</a:t>
+              <a:t>19/02/2014</a:t>
             </a:fld>
             <a:endParaRPr lang="en-GB"/>
           </a:p>
@@ -2346,7 +2351,7 @@
           <a:p>
             <a:fld id="{9C0B748F-EC5C-472B-8836-94BE95C08E9F}" type="datetimeFigureOut">
               <a:rPr lang="en-GB" smtClean="0"/>
-              <a:t>17/02/2014</a:t>
+              <a:t>19/02/2014</a:t>
             </a:fld>
             <a:endParaRPr lang="en-GB"/>
           </a:p>
@@ -2559,7 +2564,7 @@
           <a:p>
             <a:fld id="{9C0B748F-EC5C-472B-8836-94BE95C08E9F}" type="datetimeFigureOut">
               <a:rPr lang="en-GB" smtClean="0"/>
-              <a:t>17/02/2014</a:t>
+              <a:t>19/02/2014</a:t>
             </a:fld>
             <a:endParaRPr lang="en-GB"/>
           </a:p>
@@ -4229,6 +4234,116 @@
           </p:txBody>
         </p:sp>
       </p:grpSp>
+      <p:sp>
+        <p:nvSpPr>
+          <p:cNvPr id="2" name="TextBox 1"/>
+          <p:cNvSpPr txBox="1"/>
+          <p:nvPr/>
+        </p:nvSpPr>
+        <p:spPr>
+          <a:xfrm>
+            <a:off x="3497257" y="2063152"/>
+            <a:ext cx="301686" cy="369332"/>
+          </a:xfrm>
+          <a:prstGeom prst="rect">
+            <a:avLst/>
+          </a:prstGeom>
+          <a:solidFill>
+            <a:schemeClr val="tx1"/>
+          </a:solidFill>
+        </p:spPr>
+        <p:txBody>
+          <a:bodyPr wrap="none" rtlCol="0">
+            <a:spAutoFit/>
+          </a:bodyPr>
+          <a:lstStyle/>
+          <a:p>
+            <a:r>
+              <a:rPr lang="en-GB" dirty="0">
+                <a:solidFill>
+                  <a:schemeClr val="bg1"/>
+                </a:solidFill>
+              </a:rPr>
+              <a:t>1</a:t>
+            </a:r>
+          </a:p>
+        </p:txBody>
+      </p:sp>
+      <p:sp>
+        <p:nvSpPr>
+          <p:cNvPr id="41" name="TextBox 40"/>
+          <p:cNvSpPr txBox="1"/>
+          <p:nvPr/>
+        </p:nvSpPr>
+        <p:spPr>
+          <a:xfrm>
+            <a:off x="7174387" y="2432484"/>
+            <a:ext cx="301686" cy="369332"/>
+          </a:xfrm>
+          <a:prstGeom prst="rect">
+            <a:avLst/>
+          </a:prstGeom>
+          <a:solidFill>
+            <a:schemeClr val="tx1"/>
+          </a:solidFill>
+        </p:spPr>
+        <p:txBody>
+          <a:bodyPr wrap="none" rtlCol="0">
+            <a:spAutoFit/>
+          </a:bodyPr>
+          <a:lstStyle/>
+          <a:p>
+            <a:r>
+              <a:rPr lang="en-GB" dirty="0">
+                <a:solidFill>
+                  <a:schemeClr val="bg1"/>
+                </a:solidFill>
+              </a:rPr>
+              <a:t>2</a:t>
+            </a:r>
+          </a:p>
+        </p:txBody>
+      </p:sp>
+      <p:sp>
+        <p:nvSpPr>
+          <p:cNvPr id="42" name="TextBox 41"/>
+          <p:cNvSpPr txBox="1"/>
+          <p:nvPr/>
+        </p:nvSpPr>
+        <p:spPr>
+          <a:xfrm>
+            <a:off x="2948995" y="6095279"/>
+            <a:ext cx="301686" cy="369332"/>
+          </a:xfrm>
+          <a:prstGeom prst="rect">
+            <a:avLst/>
+          </a:prstGeom>
+          <a:solidFill>
+            <a:schemeClr val="tx1"/>
+          </a:solidFill>
+        </p:spPr>
+        <p:txBody>
+          <a:bodyPr wrap="none" rtlCol="0">
+            <a:spAutoFit/>
+          </a:bodyPr>
+          <a:lstStyle/>
+          <a:p>
+            <a:r>
+              <a:rPr lang="en-GB" dirty="0" smtClean="0">
+                <a:solidFill>
+                  <a:schemeClr val="bg1"/>
+                </a:solidFill>
+              </a:rPr>
+              <a:t>3</a:t>
+            </a:r>
+            <a:endParaRPr lang="en-GB" dirty="0">
+              <a:solidFill>
+                <a:schemeClr val="bg1"/>
+              </a:solidFill>
+            </a:endParaRPr>
+          </a:p>
+        </p:txBody>
+      </p:sp>
     </p:spTree>
     <p:extLst>
       <p:ext uri="{BB962C8B-B14F-4D97-AF65-F5344CB8AC3E}">

</xml_diff>

<commit_message>
Add step 4 to architecture diagram
</commit_message>
<xml_diff>
--- a/Documentation/Architecture Diagram.pptx
+++ b/Documentation/Architecture Diagram.pptx
@@ -4242,7 +4242,7 @@
         </p:nvSpPr>
         <p:spPr>
           <a:xfrm>
-            <a:off x="3497257" y="2063152"/>
+            <a:off x="3811590" y="294755"/>
             <a:ext cx="301686" cy="369332"/>
           </a:xfrm>
           <a:prstGeom prst="rect">
@@ -4277,7 +4277,7 @@
         </p:nvSpPr>
         <p:spPr>
           <a:xfrm>
-            <a:off x="7174387" y="2432484"/>
+            <a:off x="4317414" y="2432484"/>
             <a:ext cx="301686" cy="369332"/>
           </a:xfrm>
           <a:prstGeom prst="rect">
@@ -4335,6 +4335,46 @@
                 </a:solidFill>
               </a:rPr>
               <a:t>3</a:t>
+            </a:r>
+            <a:endParaRPr lang="en-GB" dirty="0">
+              <a:solidFill>
+                <a:schemeClr val="bg1"/>
+              </a:solidFill>
+            </a:endParaRPr>
+          </a:p>
+        </p:txBody>
+      </p:sp>
+      <p:sp>
+        <p:nvSpPr>
+          <p:cNvPr id="43" name="TextBox 42"/>
+          <p:cNvSpPr txBox="1"/>
+          <p:nvPr/>
+        </p:nvSpPr>
+        <p:spPr>
+          <a:xfrm>
+            <a:off x="7023544" y="2432484"/>
+            <a:ext cx="301686" cy="369332"/>
+          </a:xfrm>
+          <a:prstGeom prst="rect">
+            <a:avLst/>
+          </a:prstGeom>
+          <a:solidFill>
+            <a:schemeClr val="tx1"/>
+          </a:solidFill>
+        </p:spPr>
+        <p:txBody>
+          <a:bodyPr wrap="none" rtlCol="0">
+            <a:spAutoFit/>
+          </a:bodyPr>
+          <a:lstStyle/>
+          <a:p>
+            <a:r>
+              <a:rPr lang="en-GB" dirty="0" smtClean="0">
+                <a:solidFill>
+                  <a:schemeClr val="bg1"/>
+                </a:solidFill>
+              </a:rPr>
+              <a:t>4</a:t>
             </a:r>
             <a:endParaRPr lang="en-GB" dirty="0">
               <a:solidFill>

</xml_diff>

<commit_message>
Add scale computers image to powerpoint
</commit_message>
<xml_diff>
--- a/Documentation/Architecture Diagram.pptx
+++ b/Documentation/Architecture Diagram.pptx
@@ -7,6 +7,7 @@
   <p:sldIdLst>
     <p:sldId id="257" r:id="rId2"/>
     <p:sldId id="256" r:id="rId3"/>
+    <p:sldId id="258" r:id="rId4"/>
   </p:sldIdLst>
   <p:sldSz cx="12192000" cy="6858000"/>
   <p:notesSz cx="6858000" cy="9144000"/>
@@ -244,7 +245,7 @@
           <a:p>
             <a:fld id="{9C0B748F-EC5C-472B-8836-94BE95C08E9F}" type="datetimeFigureOut">
               <a:rPr lang="en-GB" smtClean="0"/>
-              <a:t>09/03/2014</a:t>
+              <a:t>10/03/2014</a:t>
             </a:fld>
             <a:endParaRPr lang="en-GB"/>
           </a:p>
@@ -414,7 +415,7 @@
           <a:p>
             <a:fld id="{9C0B748F-EC5C-472B-8836-94BE95C08E9F}" type="datetimeFigureOut">
               <a:rPr lang="en-GB" smtClean="0"/>
-              <a:t>09/03/2014</a:t>
+              <a:t>10/03/2014</a:t>
             </a:fld>
             <a:endParaRPr lang="en-GB"/>
           </a:p>
@@ -594,7 +595,7 @@
           <a:p>
             <a:fld id="{9C0B748F-EC5C-472B-8836-94BE95C08E9F}" type="datetimeFigureOut">
               <a:rPr lang="en-GB" smtClean="0"/>
-              <a:t>09/03/2014</a:t>
+              <a:t>10/03/2014</a:t>
             </a:fld>
             <a:endParaRPr lang="en-GB"/>
           </a:p>
@@ -764,7 +765,7 @@
           <a:p>
             <a:fld id="{9C0B748F-EC5C-472B-8836-94BE95C08E9F}" type="datetimeFigureOut">
               <a:rPr lang="en-GB" smtClean="0"/>
-              <a:t>09/03/2014</a:t>
+              <a:t>10/03/2014</a:t>
             </a:fld>
             <a:endParaRPr lang="en-GB"/>
           </a:p>
@@ -1010,7 +1011,7 @@
           <a:p>
             <a:fld id="{9C0B748F-EC5C-472B-8836-94BE95C08E9F}" type="datetimeFigureOut">
               <a:rPr lang="en-GB" smtClean="0"/>
-              <a:t>09/03/2014</a:t>
+              <a:t>10/03/2014</a:t>
             </a:fld>
             <a:endParaRPr lang="en-GB"/>
           </a:p>
@@ -1242,7 +1243,7 @@
           <a:p>
             <a:fld id="{9C0B748F-EC5C-472B-8836-94BE95C08E9F}" type="datetimeFigureOut">
               <a:rPr lang="en-GB" smtClean="0"/>
-              <a:t>09/03/2014</a:t>
+              <a:t>10/03/2014</a:t>
             </a:fld>
             <a:endParaRPr lang="en-GB"/>
           </a:p>
@@ -1609,7 +1610,7 @@
           <a:p>
             <a:fld id="{9C0B748F-EC5C-472B-8836-94BE95C08E9F}" type="datetimeFigureOut">
               <a:rPr lang="en-GB" smtClean="0"/>
-              <a:t>09/03/2014</a:t>
+              <a:t>10/03/2014</a:t>
             </a:fld>
             <a:endParaRPr lang="en-GB"/>
           </a:p>
@@ -1727,7 +1728,7 @@
           <a:p>
             <a:fld id="{9C0B748F-EC5C-472B-8836-94BE95C08E9F}" type="datetimeFigureOut">
               <a:rPr lang="en-GB" smtClean="0"/>
-              <a:t>09/03/2014</a:t>
+              <a:t>10/03/2014</a:t>
             </a:fld>
             <a:endParaRPr lang="en-GB"/>
           </a:p>
@@ -1822,7 +1823,7 @@
           <a:p>
             <a:fld id="{9C0B748F-EC5C-472B-8836-94BE95C08E9F}" type="datetimeFigureOut">
               <a:rPr lang="en-GB" smtClean="0"/>
-              <a:t>09/03/2014</a:t>
+              <a:t>10/03/2014</a:t>
             </a:fld>
             <a:endParaRPr lang="en-GB"/>
           </a:p>
@@ -2099,7 +2100,7 @@
           <a:p>
             <a:fld id="{9C0B748F-EC5C-472B-8836-94BE95C08E9F}" type="datetimeFigureOut">
               <a:rPr lang="en-GB" smtClean="0"/>
-              <a:t>09/03/2014</a:t>
+              <a:t>10/03/2014</a:t>
             </a:fld>
             <a:endParaRPr lang="en-GB"/>
           </a:p>
@@ -2352,7 +2353,7 @@
           <a:p>
             <a:fld id="{9C0B748F-EC5C-472B-8836-94BE95C08E9F}" type="datetimeFigureOut">
               <a:rPr lang="en-GB" smtClean="0"/>
-              <a:t>09/03/2014</a:t>
+              <a:t>10/03/2014</a:t>
             </a:fld>
             <a:endParaRPr lang="en-GB"/>
           </a:p>
@@ -2565,7 +2566,7 @@
           <a:p>
             <a:fld id="{9C0B748F-EC5C-472B-8836-94BE95C08E9F}" type="datetimeFigureOut">
               <a:rPr lang="en-GB" smtClean="0"/>
-              <a:t>09/03/2014</a:t>
+              <a:t>10/03/2014</a:t>
             </a:fld>
             <a:endParaRPr lang="en-GB"/>
           </a:p>
@@ -4739,6 +4740,374 @@
 </p:sld>
 </file>
 
+<file path=ppt/slides/slide3.xml><?xml version="1.0" encoding="utf-8"?>
+<p:sld xmlns:a="http://schemas.openxmlformats.org/drawingml/2006/main" xmlns:r="http://schemas.openxmlformats.org/officeDocument/2006/relationships" xmlns:p="http://schemas.openxmlformats.org/presentationml/2006/main">
+  <p:cSld>
+    <p:spTree>
+      <p:nvGrpSpPr>
+        <p:cNvPr id="1" name=""/>
+        <p:cNvGrpSpPr/>
+        <p:nvPr/>
+      </p:nvGrpSpPr>
+      <p:grpSpPr>
+        <a:xfrm>
+          <a:off x="0" y="0"/>
+          <a:ext cx="0" cy="0"/>
+          <a:chOff x="0" y="0"/>
+          <a:chExt cx="0" cy="0"/>
+        </a:xfrm>
+      </p:grpSpPr>
+      <p:pic>
+        <p:nvPicPr>
+          <p:cNvPr id="4" name="Picture 3"/>
+          <p:cNvPicPr>
+            <a:picLocks noChangeAspect="1"/>
+          </p:cNvPicPr>
+          <p:nvPr/>
+        </p:nvPicPr>
+        <p:blipFill>
+          <a:blip r:embed="rId2">
+            <a:extLst>
+              <a:ext uri="{28A0092B-C50C-407E-A947-70E740481C1C}">
+                <a14:useLocalDpi xmlns:a14="http://schemas.microsoft.com/office/drawing/2010/main" val="0"/>
+              </a:ext>
+            </a:extLst>
+          </a:blip>
+          <a:stretch>
+            <a:fillRect/>
+          </a:stretch>
+        </p:blipFill>
+        <p:spPr>
+          <a:xfrm>
+            <a:off x="1047596" y="2937567"/>
+            <a:ext cx="1828571" cy="1828571"/>
+          </a:xfrm>
+          <a:prstGeom prst="rect">
+            <a:avLst/>
+          </a:prstGeom>
+        </p:spPr>
+      </p:pic>
+      <p:pic>
+        <p:nvPicPr>
+          <p:cNvPr id="5" name="Picture 4"/>
+          <p:cNvPicPr>
+            <a:picLocks noChangeAspect="1"/>
+          </p:cNvPicPr>
+          <p:nvPr/>
+        </p:nvPicPr>
+        <p:blipFill>
+          <a:blip r:embed="rId2">
+            <a:extLst>
+              <a:ext uri="{28A0092B-C50C-407E-A947-70E740481C1C}">
+                <a14:useLocalDpi xmlns:a14="http://schemas.microsoft.com/office/drawing/2010/main" val="0"/>
+              </a:ext>
+            </a:extLst>
+          </a:blip>
+          <a:stretch>
+            <a:fillRect/>
+          </a:stretch>
+        </p:blipFill>
+        <p:spPr>
+          <a:xfrm>
+            <a:off x="5954671" y="986530"/>
+            <a:ext cx="1828571" cy="1828571"/>
+          </a:xfrm>
+          <a:prstGeom prst="rect">
+            <a:avLst/>
+          </a:prstGeom>
+        </p:spPr>
+      </p:pic>
+      <p:pic>
+        <p:nvPicPr>
+          <p:cNvPr id="6" name="Picture 5"/>
+          <p:cNvPicPr>
+            <a:picLocks noChangeAspect="1"/>
+          </p:cNvPicPr>
+          <p:nvPr/>
+        </p:nvPicPr>
+        <p:blipFill>
+          <a:blip r:embed="rId2">
+            <a:extLst>
+              <a:ext uri="{28A0092B-C50C-407E-A947-70E740481C1C}">
+                <a14:useLocalDpi xmlns:a14="http://schemas.microsoft.com/office/drawing/2010/main" val="0"/>
+              </a:ext>
+            </a:extLst>
+          </a:blip>
+          <a:stretch>
+            <a:fillRect/>
+          </a:stretch>
+        </p:blipFill>
+        <p:spPr>
+          <a:xfrm>
+            <a:off x="5955976" y="2937568"/>
+            <a:ext cx="1828571" cy="1828571"/>
+          </a:xfrm>
+          <a:prstGeom prst="rect">
+            <a:avLst/>
+          </a:prstGeom>
+        </p:spPr>
+      </p:pic>
+      <p:pic>
+        <p:nvPicPr>
+          <p:cNvPr id="7" name="Picture 6"/>
+          <p:cNvPicPr>
+            <a:picLocks noChangeAspect="1"/>
+          </p:cNvPicPr>
+          <p:nvPr/>
+        </p:nvPicPr>
+        <p:blipFill>
+          <a:blip r:embed="rId2">
+            <a:extLst>
+              <a:ext uri="{28A0092B-C50C-407E-A947-70E740481C1C}">
+                <a14:useLocalDpi xmlns:a14="http://schemas.microsoft.com/office/drawing/2010/main" val="0"/>
+              </a:ext>
+            </a:extLst>
+          </a:blip>
+          <a:stretch>
+            <a:fillRect/>
+          </a:stretch>
+        </p:blipFill>
+        <p:spPr>
+          <a:xfrm>
+            <a:off x="7783243" y="986533"/>
+            <a:ext cx="1828571" cy="1828571"/>
+          </a:xfrm>
+          <a:prstGeom prst="rect">
+            <a:avLst/>
+          </a:prstGeom>
+        </p:spPr>
+      </p:pic>
+      <p:pic>
+        <p:nvPicPr>
+          <p:cNvPr id="8" name="Picture 7"/>
+          <p:cNvPicPr>
+            <a:picLocks noChangeAspect="1"/>
+          </p:cNvPicPr>
+          <p:nvPr/>
+        </p:nvPicPr>
+        <p:blipFill>
+          <a:blip r:embed="rId2">
+            <a:extLst>
+              <a:ext uri="{28A0092B-C50C-407E-A947-70E740481C1C}">
+                <a14:useLocalDpi xmlns:a14="http://schemas.microsoft.com/office/drawing/2010/main" val="0"/>
+              </a:ext>
+            </a:extLst>
+          </a:blip>
+          <a:stretch>
+            <a:fillRect/>
+          </a:stretch>
+        </p:blipFill>
+        <p:spPr>
+          <a:xfrm>
+            <a:off x="7783245" y="2937571"/>
+            <a:ext cx="1828571" cy="1828571"/>
+          </a:xfrm>
+          <a:prstGeom prst="rect">
+            <a:avLst/>
+          </a:prstGeom>
+        </p:spPr>
+      </p:pic>
+      <p:pic>
+        <p:nvPicPr>
+          <p:cNvPr id="9" name="Picture 8"/>
+          <p:cNvPicPr>
+            <a:picLocks noChangeAspect="1"/>
+          </p:cNvPicPr>
+          <p:nvPr/>
+        </p:nvPicPr>
+        <p:blipFill>
+          <a:blip r:embed="rId2">
+            <a:extLst>
+              <a:ext uri="{28A0092B-C50C-407E-A947-70E740481C1C}">
+                <a14:useLocalDpi xmlns:a14="http://schemas.microsoft.com/office/drawing/2010/main" val="0"/>
+              </a:ext>
+            </a:extLst>
+          </a:blip>
+          <a:stretch>
+            <a:fillRect/>
+          </a:stretch>
+        </p:blipFill>
+        <p:spPr>
+          <a:xfrm>
+            <a:off x="5954672" y="4888603"/>
+            <a:ext cx="1828571" cy="1828571"/>
+          </a:xfrm>
+          <a:prstGeom prst="rect">
+            <a:avLst/>
+          </a:prstGeom>
+        </p:spPr>
+      </p:pic>
+      <p:pic>
+        <p:nvPicPr>
+          <p:cNvPr id="10" name="Picture 9"/>
+          <p:cNvPicPr>
+            <a:picLocks noChangeAspect="1"/>
+          </p:cNvPicPr>
+          <p:nvPr/>
+        </p:nvPicPr>
+        <p:blipFill>
+          <a:blip r:embed="rId2">
+            <a:extLst>
+              <a:ext uri="{28A0092B-C50C-407E-A947-70E740481C1C}">
+                <a14:useLocalDpi xmlns:a14="http://schemas.microsoft.com/office/drawing/2010/main" val="0"/>
+              </a:ext>
+            </a:extLst>
+          </a:blip>
+          <a:stretch>
+            <a:fillRect/>
+          </a:stretch>
+        </p:blipFill>
+        <p:spPr>
+          <a:xfrm>
+            <a:off x="7783243" y="4888602"/>
+            <a:ext cx="1828571" cy="1828571"/>
+          </a:xfrm>
+          <a:prstGeom prst="rect">
+            <a:avLst/>
+          </a:prstGeom>
+        </p:spPr>
+      </p:pic>
+      <p:pic>
+        <p:nvPicPr>
+          <p:cNvPr id="11" name="Picture 10"/>
+          <p:cNvPicPr>
+            <a:picLocks noChangeAspect="1"/>
+          </p:cNvPicPr>
+          <p:nvPr/>
+        </p:nvPicPr>
+        <p:blipFill>
+          <a:blip r:embed="rId2">
+            <a:extLst>
+              <a:ext uri="{28A0092B-C50C-407E-A947-70E740481C1C}">
+                <a14:useLocalDpi xmlns:a14="http://schemas.microsoft.com/office/drawing/2010/main" val="0"/>
+              </a:ext>
+            </a:extLst>
+          </a:blip>
+          <a:stretch>
+            <a:fillRect/>
+          </a:stretch>
+        </p:blipFill>
+        <p:spPr>
+          <a:xfrm>
+            <a:off x="9504837" y="4888602"/>
+            <a:ext cx="1828571" cy="1828571"/>
+          </a:xfrm>
+          <a:prstGeom prst="rect">
+            <a:avLst/>
+          </a:prstGeom>
+        </p:spPr>
+      </p:pic>
+      <p:pic>
+        <p:nvPicPr>
+          <p:cNvPr id="12" name="Picture 11"/>
+          <p:cNvPicPr>
+            <a:picLocks noChangeAspect="1"/>
+          </p:cNvPicPr>
+          <p:nvPr/>
+        </p:nvPicPr>
+        <p:blipFill>
+          <a:blip r:embed="rId2">
+            <a:extLst>
+              <a:ext uri="{28A0092B-C50C-407E-A947-70E740481C1C}">
+                <a14:useLocalDpi xmlns:a14="http://schemas.microsoft.com/office/drawing/2010/main" val="0"/>
+              </a:ext>
+            </a:extLst>
+          </a:blip>
+          <a:stretch>
+            <a:fillRect/>
+          </a:stretch>
+        </p:blipFill>
+        <p:spPr>
+          <a:xfrm>
+            <a:off x="9504837" y="2937568"/>
+            <a:ext cx="1828571" cy="1828571"/>
+          </a:xfrm>
+          <a:prstGeom prst="rect">
+            <a:avLst/>
+          </a:prstGeom>
+        </p:spPr>
+      </p:pic>
+      <p:pic>
+        <p:nvPicPr>
+          <p:cNvPr id="13" name="Picture 12"/>
+          <p:cNvPicPr>
+            <a:picLocks noChangeAspect="1"/>
+          </p:cNvPicPr>
+          <p:nvPr/>
+        </p:nvPicPr>
+        <p:blipFill>
+          <a:blip r:embed="rId2">
+            <a:extLst>
+              <a:ext uri="{28A0092B-C50C-407E-A947-70E740481C1C}">
+                <a14:useLocalDpi xmlns:a14="http://schemas.microsoft.com/office/drawing/2010/main" val="0"/>
+              </a:ext>
+            </a:extLst>
+          </a:blip>
+          <a:stretch>
+            <a:fillRect/>
+          </a:stretch>
+        </p:blipFill>
+        <p:spPr>
+          <a:xfrm>
+            <a:off x="9504836" y="986529"/>
+            <a:ext cx="1828571" cy="1828571"/>
+          </a:xfrm>
+          <a:prstGeom prst="rect">
+            <a:avLst/>
+          </a:prstGeom>
+        </p:spPr>
+      </p:pic>
+      <p:sp>
+        <p:nvSpPr>
+          <p:cNvPr id="15" name="Down Arrow 14"/>
+          <p:cNvSpPr/>
+          <p:nvPr/>
+        </p:nvSpPr>
+        <p:spPr>
+          <a:xfrm rot="16200000">
+            <a:off x="3902237" y="2511129"/>
+            <a:ext cx="1027669" cy="2681445"/>
+          </a:xfrm>
+          <a:prstGeom prst="downArrow">
+            <a:avLst/>
+          </a:prstGeom>
+        </p:spPr>
+        <p:style>
+          <a:lnRef idx="0">
+            <a:schemeClr val="accent1"/>
+          </a:lnRef>
+          <a:fillRef idx="3">
+            <a:schemeClr val="accent1"/>
+          </a:fillRef>
+          <a:effectRef idx="3">
+            <a:schemeClr val="accent1"/>
+          </a:effectRef>
+          <a:fontRef idx="minor">
+            <a:schemeClr val="lt1"/>
+          </a:fontRef>
+        </p:style>
+        <p:txBody>
+          <a:bodyPr rtlCol="0" anchor="ctr"/>
+          <a:lstStyle/>
+          <a:p>
+            <a:pPr algn="ctr"/>
+            <a:endParaRPr lang="en-GB"/>
+          </a:p>
+        </p:txBody>
+      </p:sp>
+    </p:spTree>
+    <p:extLst>
+      <p:ext uri="{BB962C8B-B14F-4D97-AF65-F5344CB8AC3E}">
+        <p14:creationId xmlns:p14="http://schemas.microsoft.com/office/powerpoint/2010/main" val="250195784"/>
+      </p:ext>
+    </p:extLst>
+  </p:cSld>
+  <p:clrMapOvr>
+    <a:masterClrMapping/>
+  </p:clrMapOvr>
+</p:sld>
+</file>
+
 <file path=ppt/theme/theme1.xml><?xml version="1.0" encoding="utf-8"?>
 <a:theme xmlns:a="http://schemas.openxmlformats.org/drawingml/2006/main" name="Office Theme">
   <a:themeElements>

</xml_diff>